<commit_message>
a little tweak in the refactor
</commit_message>
<xml_diff>
--- a/final-presentations/2021-03-25-iss/07-refactoring.pptx
+++ b/final-presentations/2021-03-25-iss/07-refactoring.pptx
@@ -279,7 +279,7 @@
           <a:p>
             <a:fld id="{0B842F42-2CE9-4E35-95C1-410DC08A50B1}" type="datetimeFigureOut">
               <a:rPr lang="en-US" smtClean="0"/>
-              <a:t>3/22/2021</a:t>
+              <a:t>3/25/21</a:t>
             </a:fld>
             <a:endParaRPr lang="en-US"/>
           </a:p>
@@ -444,7 +444,7 @@
           <a:p>
             <a:fld id="{6F282904-F315-4730-8D91-37D99E141A6F}" type="datetimeFigureOut">
               <a:rPr lang="en-US" smtClean="0"/>
-              <a:t>3/22/2021</a:t>
+              <a:t>3/25/21</a:t>
             </a:fld>
             <a:endParaRPr lang="en-US"/>
           </a:p>
@@ -5203,15 +5203,12 @@
           <a:p>
             <a:pPr lvl="1"/>
             <a:r>
-              <a:rPr lang="en-US" dirty="0"/>
-              <a:t>Though a solution is there in the repo, your solution need not be identical</a:t>
-            </a:r>
-          </a:p>
-          <a:p>
-            <a:pPr lvl="1"/>
-            <a:r>
-              <a:rPr lang="en-US" dirty="0"/>
-              <a:t>Think about how you want your final product to be and then go through the exercise of refactoring</a:t>
+              <a:rPr lang="en-US"/>
+              <a:t>Think </a:t>
+            </a:r>
+            <a:r>
+              <a:rPr lang="en-US" dirty="0"/>
+              <a:t>about how you want your final product to be and then go through the exercise of refactoring</a:t>
             </a:r>
           </a:p>
           <a:p>
@@ -15550,6 +15547,15 @@
 </file>
 
 <file path=customXml/item1.xml><?xml version="1.0" encoding="utf-8"?>
+<?mso-contentType ?>
+<FormTemplates xmlns="http://schemas.microsoft.com/sharepoint/v3/contenttype/forms">
+  <Display>DocumentLibraryForm</Display>
+  <Edit>DocumentLibraryForm</Edit>
+  <New>DocumentLibraryForm</New>
+</FormTemplates>
+</file>
+
+<file path=customXml/item2.xml><?xml version="1.0" encoding="utf-8"?>
 <ct:contentTypeSchema xmlns:ct="http://schemas.microsoft.com/office/2006/metadata/contentType" xmlns:ma="http://schemas.microsoft.com/office/2006/metadata/properties/metaAttributes" ct:_="" ma:_="" ma:contentTypeName="Document" ma:contentTypeID="0x010100565464437F680748A68B85EB6594EA7D" ma:contentTypeVersion="0" ma:contentTypeDescription="Create a new document." ma:contentTypeScope="" ma:versionID="fe3f4dd58d5914c51cfc6deaa8ad845c">
   <xsd:schema xmlns:xsd="http://www.w3.org/2001/XMLSchema" xmlns:p="http://schemas.microsoft.com/office/2006/metadata/properties" targetNamespace="http://schemas.microsoft.com/office/2006/metadata/properties" ma:root="true" ma:fieldsID="4aeb20c0e3442673af7ee10786458764">
     <xsd:element name="properties">
@@ -15598,15 +15604,6 @@
 </ct:contentTypeSchema>
 </file>
 
-<file path=customXml/item2.xml><?xml version="1.0" encoding="utf-8"?>
-<?mso-contentType ?>
-<FormTemplates xmlns="http://schemas.microsoft.com/sharepoint/v3/contenttype/forms">
-  <Display>DocumentLibraryForm</Display>
-  <Edit>DocumentLibraryForm</Edit>
-  <New>DocumentLibraryForm</New>
-</FormTemplates>
-</file>
-
 <file path=customXml/item3.xml><?xml version="1.0" encoding="utf-8"?>
 <p:properties xmlns:p="http://schemas.microsoft.com/office/2006/metadata/properties" xmlns:xsi="http://www.w3.org/2001/XMLSchema-instance" xmlns:pc="http://schemas.microsoft.com/office/infopath/2007/PartnerControls">
   <documentManagement/>
@@ -15614,6 +15611,14 @@
 </file>
 
 <file path=customXml/itemProps1.xml><?xml version="1.0" encoding="utf-8"?>
+<ds:datastoreItem xmlns:ds="http://schemas.openxmlformats.org/officeDocument/2006/customXml" ds:itemID="{19E20559-B232-4371-8690-E3D8007EDB82}">
+  <ds:schemaRefs>
+    <ds:schemaRef ds:uri="http://schemas.microsoft.com/sharepoint/v3/contenttype/forms"/>
+  </ds:schemaRefs>
+</ds:datastoreItem>
+</file>
+
+<file path=customXml/itemProps2.xml><?xml version="1.0" encoding="utf-8"?>
 <ds:datastoreItem xmlns:ds="http://schemas.openxmlformats.org/officeDocument/2006/customXml" ds:itemID="{E8DB7DEB-074E-4EE8-9B6E-FD277323109C}">
   <ds:schemaRefs>
     <ds:schemaRef ds:uri="http://schemas.microsoft.com/office/2006/metadata/contentType"/>
@@ -15624,14 +15629,6 @@
     <ds:schemaRef ds:uri="http://purl.org/dc/elements/1.1/"/>
     <ds:schemaRef ds:uri="http://purl.org/dc/terms/"/>
     <ds:schemaRef ds:uri="http://schemas.microsoft.com/office/internal/2005/internalDocumentation"/>
-  </ds:schemaRefs>
-</ds:datastoreItem>
-</file>
-
-<file path=customXml/itemProps2.xml><?xml version="1.0" encoding="utf-8"?>
-<ds:datastoreItem xmlns:ds="http://schemas.openxmlformats.org/officeDocument/2006/customXml" ds:itemID="{19E20559-B232-4371-8690-E3D8007EDB82}">
-  <ds:schemaRefs>
-    <ds:schemaRef ds:uri="http://schemas.microsoft.com/sharepoint/v3/contenttype/forms"/>
   </ds:schemaRefs>
 </ds:datastoreItem>
 </file>

</xml_diff>